<commit_message>
update Git and folders
</commit_message>
<xml_diff>
--- a/Campus recruitment/秋招分享/Share.pptx
+++ b/Campus recruitment/秋招分享/Share.pptx
@@ -216,7 +216,7 @@
           <a:p>
             <a:fld id="{B72B7461-D221-4313-900B-D10305BC04EC}" type="datetimeFigureOut">
               <a:rPr lang="zh-CN" altLang="en-US" smtClean="0"/>
-              <a:t>2023/11/11</a:t>
+              <a:t>2024/7/29</a:t>
             </a:fld>
             <a:endParaRPr lang="zh-CN" altLang="en-US"/>
           </a:p>
@@ -3548,7 +3548,7 @@
                 </a:solidFill>
               </a:rPr>
               <a:pPr/>
-              <a:t>2023/11/11</a:t>
+              <a:t>2024/7/29</a:t>
             </a:fld>
             <a:endParaRPr lang="zh-CN" altLang="en-US">
               <a:solidFill>
@@ -3778,7 +3778,7 @@
                 </a:solidFill>
               </a:rPr>
               <a:pPr/>
-              <a:t>2023/11/11</a:t>
+              <a:t>2024/7/29</a:t>
             </a:fld>
             <a:endParaRPr lang="zh-CN" altLang="en-US">
               <a:solidFill>
@@ -4995,10 +4995,10 @@
         </p:nvGrpSpPr>
         <p:grpSpPr>
           <a:xfrm>
-            <a:off x="868978" y="1834367"/>
-            <a:ext cx="2335896" cy="737043"/>
-            <a:chOff x="996821" y="810988"/>
-            <a:chExt cx="2335896" cy="737043"/>
+            <a:off x="936159" y="1834367"/>
+            <a:ext cx="2172998" cy="737043"/>
+            <a:chOff x="1064002" y="810988"/>
+            <a:chExt cx="2172998" cy="737043"/>
           </a:xfrm>
         </p:grpSpPr>
         <p:sp>
@@ -5068,8 +5068,8 @@
           </p:nvSpPr>
           <p:spPr>
             <a:xfrm>
-              <a:off x="996821" y="930852"/>
-              <a:ext cx="2335896" cy="497316"/>
+              <a:off x="1150708" y="930852"/>
+              <a:ext cx="2028120" cy="497316"/>
             </a:xfrm>
             <a:prstGeom prst="rect">
               <a:avLst/>
@@ -5106,8 +5106,27 @@
                   <a:ea typeface="微软雅黑"/>
                   <a:sym typeface="Arial"/>
                 </a:rPr>
-                <a:t>计科李帅洋</a:t>
+                <a:t>计科</a:t>
               </a:r>
+              <a:r>
+                <a:rPr lang="en-US" altLang="zh-CN" sz="2400" b="1" spc="300">
+                  <a:solidFill>
+                    <a:prstClr val="white"/>
+                  </a:solidFill>
+                  <a:latin typeface="Arial"/>
+                  <a:ea typeface="微软雅黑"/>
+                  <a:sym typeface="Arial"/>
+                </a:rPr>
+                <a:t>XXX</a:t>
+              </a:r>
+              <a:endParaRPr lang="zh-CN" altLang="en-US" sz="2400" b="1" spc="300" dirty="0">
+                <a:solidFill>
+                  <a:prstClr val="white"/>
+                </a:solidFill>
+                <a:latin typeface="Arial"/>
+                <a:ea typeface="微软雅黑"/>
+                <a:sym typeface="Arial"/>
+              </a:endParaRPr>
             </a:p>
           </p:txBody>
         </p:sp>

</xml_diff>